<commit_message>
created restapi for employee
</commit_message>
<xml_diff>
--- a/TaskMgmt/TaskManagementArchitecture.pptx
+++ b/TaskMgmt/TaskManagementArchitecture.pptx
@@ -6,6 +6,9 @@
   </p:sldMasterIdLst>
   <p:sldIdLst>
     <p:sldId id="256" r:id="rId2"/>
+    <p:sldId id="257" r:id="rId3"/>
+    <p:sldId id="259" r:id="rId4"/>
+    <p:sldId id="258" r:id="rId5"/>
   </p:sldIdLst>
   <p:sldSz cx="12192000" cy="6858000"/>
   <p:notesSz cx="6858000" cy="9144000"/>
@@ -3832,8 +3835,8 @@
         </p:nvSpPr>
         <p:spPr>
           <a:xfrm>
-            <a:off x="777747" y="1056920"/>
-            <a:ext cx="914400" cy="914400"/>
+            <a:off x="330200" y="1056920"/>
+            <a:ext cx="1361947" cy="914400"/>
           </a:xfrm>
           <a:prstGeom prst="rect">
             <a:avLst/>
@@ -3885,8 +3888,8 @@
         </p:nvSpPr>
         <p:spPr>
           <a:xfrm>
-            <a:off x="874944" y="2130292"/>
-            <a:ext cx="914400" cy="914400"/>
+            <a:off x="-23114" y="2113387"/>
+            <a:ext cx="1859257" cy="937093"/>
           </a:xfrm>
           <a:prstGeom prst="rect">
             <a:avLst/>
@@ -3985,7 +3988,7 @@
         <p:spPr>
           <a:xfrm>
             <a:off x="778042" y="3259638"/>
-            <a:ext cx="914400" cy="914400"/>
+            <a:ext cx="1258094" cy="914400"/>
           </a:xfrm>
           <a:prstGeom prst="rect">
             <a:avLst/>
@@ -4174,10 +4177,2089 @@
           </a:p>
         </p:txBody>
       </p:sp>
+      <p:pic>
+        <p:nvPicPr>
+          <p:cNvPr id="27" name="Picture 26">
+            <a:extLst>
+              <a:ext uri="{FF2B5EF4-FFF2-40B4-BE49-F238E27FC236}">
+                <a16:creationId xmlns:a16="http://schemas.microsoft.com/office/drawing/2014/main" id="{EDD5F541-264A-DB4D-AB60-6B13A0AF6DA6}"/>
+              </a:ext>
+            </a:extLst>
+          </p:cNvPr>
+          <p:cNvPicPr>
+            <a:picLocks noChangeAspect="1"/>
+          </p:cNvPicPr>
+          <p:nvPr/>
+        </p:nvPicPr>
+        <p:blipFill>
+          <a:blip r:embed="rId2"/>
+          <a:stretch>
+            <a:fillRect/>
+          </a:stretch>
+        </p:blipFill>
+        <p:spPr>
+          <a:xfrm>
+            <a:off x="3038642" y="2245823"/>
+            <a:ext cx="1581483" cy="955479"/>
+          </a:xfrm>
+          <a:prstGeom prst="rect">
+            <a:avLst/>
+          </a:prstGeom>
+        </p:spPr>
+      </p:pic>
+      <p:pic>
+        <p:nvPicPr>
+          <p:cNvPr id="28" name="Picture 27">
+            <a:extLst>
+              <a:ext uri="{FF2B5EF4-FFF2-40B4-BE49-F238E27FC236}">
+                <a16:creationId xmlns:a16="http://schemas.microsoft.com/office/drawing/2014/main" id="{5B473468-73F1-8B4F-8115-FF9E18823609}"/>
+              </a:ext>
+            </a:extLst>
+          </p:cNvPr>
+          <p:cNvPicPr>
+            <a:picLocks noChangeAspect="1"/>
+          </p:cNvPicPr>
+          <p:nvPr/>
+        </p:nvPicPr>
+        <p:blipFill>
+          <a:blip r:embed="rId2"/>
+          <a:stretch>
+            <a:fillRect/>
+          </a:stretch>
+        </p:blipFill>
+        <p:spPr>
+          <a:xfrm>
+            <a:off x="6660393" y="2270871"/>
+            <a:ext cx="1498562" cy="905381"/>
+          </a:xfrm>
+          <a:prstGeom prst="rect">
+            <a:avLst/>
+          </a:prstGeom>
+        </p:spPr>
+      </p:pic>
+      <p:pic>
+        <p:nvPicPr>
+          <p:cNvPr id="4" name="Picture 3">
+            <a:extLst>
+              <a:ext uri="{FF2B5EF4-FFF2-40B4-BE49-F238E27FC236}">
+                <a16:creationId xmlns:a16="http://schemas.microsoft.com/office/drawing/2014/main" id="{089DC95A-BFFA-6E4B-ADE4-D3691591B822}"/>
+              </a:ext>
+            </a:extLst>
+          </p:cNvPr>
+          <p:cNvPicPr>
+            <a:picLocks noChangeAspect="1"/>
+          </p:cNvPicPr>
+          <p:nvPr/>
+        </p:nvPicPr>
+        <p:blipFill>
+          <a:blip r:embed="rId3"/>
+          <a:stretch>
+            <a:fillRect/>
+          </a:stretch>
+        </p:blipFill>
+        <p:spPr>
+          <a:xfrm>
+            <a:off x="1811319" y="1054755"/>
+            <a:ext cx="797257" cy="797257"/>
+          </a:xfrm>
+          <a:prstGeom prst="rect">
+            <a:avLst/>
+          </a:prstGeom>
+        </p:spPr>
+      </p:pic>
+      <p:pic>
+        <p:nvPicPr>
+          <p:cNvPr id="6" name="Picture 5">
+            <a:extLst>
+              <a:ext uri="{FF2B5EF4-FFF2-40B4-BE49-F238E27FC236}">
+                <a16:creationId xmlns:a16="http://schemas.microsoft.com/office/drawing/2014/main" id="{0058F734-EBF8-2D45-9E1C-4B159FE4417A}"/>
+              </a:ext>
+            </a:extLst>
+          </p:cNvPr>
+          <p:cNvPicPr>
+            <a:picLocks noChangeAspect="1"/>
+          </p:cNvPicPr>
+          <p:nvPr/>
+        </p:nvPicPr>
+        <p:blipFill>
+          <a:blip r:embed="rId3"/>
+          <a:stretch>
+            <a:fillRect/>
+          </a:stretch>
+        </p:blipFill>
+        <p:spPr>
+          <a:xfrm>
+            <a:off x="1855620" y="2102619"/>
+            <a:ext cx="835524" cy="835524"/>
+          </a:xfrm>
+          <a:prstGeom prst="rect">
+            <a:avLst/>
+          </a:prstGeom>
+        </p:spPr>
+      </p:pic>
+      <p:pic>
+        <p:nvPicPr>
+          <p:cNvPr id="29" name="Picture 28">
+            <a:extLst>
+              <a:ext uri="{FF2B5EF4-FFF2-40B4-BE49-F238E27FC236}">
+                <a16:creationId xmlns:a16="http://schemas.microsoft.com/office/drawing/2014/main" id="{7673CA8B-3525-FD48-96AB-42E7BD4D0899}"/>
+              </a:ext>
+            </a:extLst>
+          </p:cNvPr>
+          <p:cNvPicPr>
+            <a:picLocks noChangeAspect="1"/>
+          </p:cNvPicPr>
+          <p:nvPr/>
+        </p:nvPicPr>
+        <p:blipFill>
+          <a:blip r:embed="rId2"/>
+          <a:stretch>
+            <a:fillRect/>
+          </a:stretch>
+        </p:blipFill>
+        <p:spPr>
+          <a:xfrm>
+            <a:off x="2008980" y="3353000"/>
+            <a:ext cx="1070018" cy="646469"/>
+          </a:xfrm>
+          <a:prstGeom prst="rect">
+            <a:avLst/>
+          </a:prstGeom>
+        </p:spPr>
+      </p:pic>
     </p:spTree>
     <p:extLst>
       <p:ext uri="{BB962C8B-B14F-4D97-AF65-F5344CB8AC3E}">
         <p14:creationId xmlns:p14="http://schemas.microsoft.com/office/powerpoint/2010/main" val="3026159182"/>
+      </p:ext>
+    </p:extLst>
+  </p:cSld>
+  <p:clrMapOvr>
+    <a:masterClrMapping/>
+  </p:clrMapOvr>
+</p:sld>
+</file>
+
+<file path=ppt/slides/slide2.xml><?xml version="1.0" encoding="utf-8"?>
+<p:sld xmlns:a="http://schemas.openxmlformats.org/drawingml/2006/main" xmlns:r="http://schemas.openxmlformats.org/officeDocument/2006/relationships" xmlns:p="http://schemas.openxmlformats.org/presentationml/2006/main">
+  <p:cSld>
+    <p:spTree>
+      <p:nvGrpSpPr>
+        <p:cNvPr id="1" name=""/>
+        <p:cNvGrpSpPr/>
+        <p:nvPr/>
+      </p:nvGrpSpPr>
+      <p:grpSpPr>
+        <a:xfrm>
+          <a:off x="0" y="0"/>
+          <a:ext cx="0" cy="0"/>
+          <a:chOff x="0" y="0"/>
+          <a:chExt cx="0" cy="0"/>
+        </a:xfrm>
+      </p:grpSpPr>
+      <p:cxnSp>
+        <p:nvCxnSpPr>
+          <p:cNvPr id="7" name="Straight Connector 6">
+            <a:extLst>
+              <a:ext uri="{FF2B5EF4-FFF2-40B4-BE49-F238E27FC236}">
+                <a16:creationId xmlns:a16="http://schemas.microsoft.com/office/drawing/2014/main" id="{77C28D95-4ACE-2A43-9065-B9937C3A023D}"/>
+              </a:ext>
+            </a:extLst>
+          </p:cNvPr>
+          <p:cNvCxnSpPr/>
+          <p:nvPr/>
+        </p:nvCxnSpPr>
+        <p:spPr>
+          <a:xfrm>
+            <a:off x="2300288" y="0"/>
+            <a:ext cx="0" cy="6858000"/>
+          </a:xfrm>
+          <a:prstGeom prst="line">
+            <a:avLst/>
+          </a:prstGeom>
+        </p:spPr>
+        <p:style>
+          <a:lnRef idx="1">
+            <a:schemeClr val="accent1"/>
+          </a:lnRef>
+          <a:fillRef idx="0">
+            <a:schemeClr val="accent1"/>
+          </a:fillRef>
+          <a:effectRef idx="0">
+            <a:schemeClr val="accent1"/>
+          </a:effectRef>
+          <a:fontRef idx="minor">
+            <a:schemeClr val="tx1"/>
+          </a:fontRef>
+        </p:style>
+      </p:cxnSp>
+      <p:sp>
+        <p:nvSpPr>
+          <p:cNvPr id="8" name="Rectangle 7">
+            <a:extLst>
+              <a:ext uri="{FF2B5EF4-FFF2-40B4-BE49-F238E27FC236}">
+                <a16:creationId xmlns:a16="http://schemas.microsoft.com/office/drawing/2014/main" id="{E7B06E62-3F64-5D41-82FE-669D5431DFE0}"/>
+              </a:ext>
+            </a:extLst>
+          </p:cNvPr>
+          <p:cNvSpPr/>
+          <p:nvPr/>
+        </p:nvSpPr>
+        <p:spPr>
+          <a:xfrm>
+            <a:off x="681037" y="461962"/>
+            <a:ext cx="1119187" cy="914400"/>
+          </a:xfrm>
+          <a:prstGeom prst="rect">
+            <a:avLst/>
+          </a:prstGeom>
+        </p:spPr>
+        <p:style>
+          <a:lnRef idx="2">
+            <a:schemeClr val="accent1">
+              <a:shade val="50000"/>
+            </a:schemeClr>
+          </a:lnRef>
+          <a:fillRef idx="1">
+            <a:schemeClr val="accent1"/>
+          </a:fillRef>
+          <a:effectRef idx="0">
+            <a:schemeClr val="accent1"/>
+          </a:effectRef>
+          <a:fontRef idx="minor">
+            <a:schemeClr val="lt1"/>
+          </a:fontRef>
+        </p:style>
+        <p:txBody>
+          <a:bodyPr rtlCol="0" anchor="ctr"/>
+          <a:lstStyle/>
+          <a:p>
+            <a:pPr algn="ctr"/>
+            <a:r>
+              <a:rPr lang="en-US" dirty="0"/>
+              <a:t>Java Common</a:t>
+            </a:r>
+          </a:p>
+        </p:txBody>
+      </p:sp>
+      <p:sp>
+        <p:nvSpPr>
+          <p:cNvPr id="9" name="Rectangle 8">
+            <a:extLst>
+              <a:ext uri="{FF2B5EF4-FFF2-40B4-BE49-F238E27FC236}">
+                <a16:creationId xmlns:a16="http://schemas.microsoft.com/office/drawing/2014/main" id="{2C9BF2A5-4605-7143-9549-527160F4A506}"/>
+              </a:ext>
+            </a:extLst>
+          </p:cNvPr>
+          <p:cNvSpPr/>
+          <p:nvPr/>
+        </p:nvSpPr>
+        <p:spPr>
+          <a:xfrm>
+            <a:off x="723901" y="5095875"/>
+            <a:ext cx="914400" cy="914400"/>
+          </a:xfrm>
+          <a:prstGeom prst="rect">
+            <a:avLst/>
+          </a:prstGeom>
+        </p:spPr>
+        <p:style>
+          <a:lnRef idx="2">
+            <a:schemeClr val="accent1">
+              <a:shade val="50000"/>
+            </a:schemeClr>
+          </a:lnRef>
+          <a:fillRef idx="1">
+            <a:schemeClr val="accent1"/>
+          </a:fillRef>
+          <a:effectRef idx="0">
+            <a:schemeClr val="accent1"/>
+          </a:effectRef>
+          <a:fontRef idx="minor">
+            <a:schemeClr val="lt1"/>
+          </a:fontRef>
+        </p:style>
+        <p:txBody>
+          <a:bodyPr rtlCol="0" anchor="ctr"/>
+          <a:lstStyle/>
+          <a:p>
+            <a:pPr algn="ctr"/>
+            <a:endParaRPr lang="en-US" dirty="0"/>
+          </a:p>
+        </p:txBody>
+      </p:sp>
+      <p:sp>
+        <p:nvSpPr>
+          <p:cNvPr id="10" name="Rectangle 9">
+            <a:extLst>
+              <a:ext uri="{FF2B5EF4-FFF2-40B4-BE49-F238E27FC236}">
+                <a16:creationId xmlns:a16="http://schemas.microsoft.com/office/drawing/2014/main" id="{E2D97411-0951-4E4C-848F-3B6F268272CA}"/>
+              </a:ext>
+            </a:extLst>
+          </p:cNvPr>
+          <p:cNvSpPr/>
+          <p:nvPr/>
+        </p:nvSpPr>
+        <p:spPr>
+          <a:xfrm>
+            <a:off x="723900" y="3419475"/>
+            <a:ext cx="1076323" cy="914400"/>
+          </a:xfrm>
+          <a:prstGeom prst="rect">
+            <a:avLst/>
+          </a:prstGeom>
+        </p:spPr>
+        <p:style>
+          <a:lnRef idx="2">
+            <a:schemeClr val="accent1">
+              <a:shade val="50000"/>
+            </a:schemeClr>
+          </a:lnRef>
+          <a:fillRef idx="1">
+            <a:schemeClr val="accent1"/>
+          </a:fillRef>
+          <a:effectRef idx="0">
+            <a:schemeClr val="accent1"/>
+          </a:effectRef>
+          <a:fontRef idx="minor">
+            <a:schemeClr val="lt1"/>
+          </a:fontRef>
+        </p:style>
+        <p:txBody>
+          <a:bodyPr rtlCol="0" anchor="ctr"/>
+          <a:lstStyle/>
+          <a:p>
+            <a:pPr algn="ctr"/>
+            <a:r>
+              <a:rPr lang="en-US" dirty="0"/>
+              <a:t>Java Services</a:t>
+            </a:r>
+          </a:p>
+        </p:txBody>
+      </p:sp>
+      <p:sp>
+        <p:nvSpPr>
+          <p:cNvPr id="11" name="Rectangle 10">
+            <a:extLst>
+              <a:ext uri="{FF2B5EF4-FFF2-40B4-BE49-F238E27FC236}">
+                <a16:creationId xmlns:a16="http://schemas.microsoft.com/office/drawing/2014/main" id="{18F53F01-DBDC-A947-A534-22693B2F1F8E}"/>
+              </a:ext>
+            </a:extLst>
+          </p:cNvPr>
+          <p:cNvSpPr/>
+          <p:nvPr/>
+        </p:nvSpPr>
+        <p:spPr>
+          <a:xfrm>
+            <a:off x="681038" y="2028825"/>
+            <a:ext cx="914400" cy="914400"/>
+          </a:xfrm>
+          <a:prstGeom prst="rect">
+            <a:avLst/>
+          </a:prstGeom>
+        </p:spPr>
+        <p:style>
+          <a:lnRef idx="2">
+            <a:schemeClr val="accent1">
+              <a:shade val="50000"/>
+            </a:schemeClr>
+          </a:lnRef>
+          <a:fillRef idx="1">
+            <a:schemeClr val="accent1"/>
+          </a:fillRef>
+          <a:effectRef idx="0">
+            <a:schemeClr val="accent1"/>
+          </a:effectRef>
+          <a:fontRef idx="minor">
+            <a:schemeClr val="lt1"/>
+          </a:fontRef>
+        </p:style>
+        <p:txBody>
+          <a:bodyPr rtlCol="0" anchor="ctr"/>
+          <a:lstStyle/>
+          <a:p>
+            <a:pPr algn="ctr"/>
+            <a:r>
+              <a:rPr lang="en-US" dirty="0"/>
+              <a:t>Java DB</a:t>
+            </a:r>
+          </a:p>
+        </p:txBody>
+      </p:sp>
+      <p:cxnSp>
+        <p:nvCxnSpPr>
+          <p:cNvPr id="13" name="Straight Connector 12">
+            <a:extLst>
+              <a:ext uri="{FF2B5EF4-FFF2-40B4-BE49-F238E27FC236}">
+                <a16:creationId xmlns:a16="http://schemas.microsoft.com/office/drawing/2014/main" id="{09704FCA-8DAC-F643-9A38-5640FD097220}"/>
+              </a:ext>
+            </a:extLst>
+          </p:cNvPr>
+          <p:cNvCxnSpPr/>
+          <p:nvPr/>
+        </p:nvCxnSpPr>
+        <p:spPr>
+          <a:xfrm>
+            <a:off x="5643563" y="0"/>
+            <a:ext cx="0" cy="6858000"/>
+          </a:xfrm>
+          <a:prstGeom prst="line">
+            <a:avLst/>
+          </a:prstGeom>
+        </p:spPr>
+        <p:style>
+          <a:lnRef idx="1">
+            <a:schemeClr val="accent1"/>
+          </a:lnRef>
+          <a:fillRef idx="0">
+            <a:schemeClr val="accent1"/>
+          </a:fillRef>
+          <a:effectRef idx="0">
+            <a:schemeClr val="accent1"/>
+          </a:effectRef>
+          <a:fontRef idx="minor">
+            <a:schemeClr val="tx1"/>
+          </a:fontRef>
+        </p:style>
+      </p:cxnSp>
+      <p:sp>
+        <p:nvSpPr>
+          <p:cNvPr id="14" name="Rectangle 13">
+            <a:extLst>
+              <a:ext uri="{FF2B5EF4-FFF2-40B4-BE49-F238E27FC236}">
+                <a16:creationId xmlns:a16="http://schemas.microsoft.com/office/drawing/2014/main" id="{36837305-3F38-B847-ADE0-55D78933EB7A}"/>
+              </a:ext>
+            </a:extLst>
+          </p:cNvPr>
+          <p:cNvSpPr/>
+          <p:nvPr/>
+        </p:nvSpPr>
+        <p:spPr>
+          <a:xfrm>
+            <a:off x="3514725" y="838199"/>
+            <a:ext cx="1200149" cy="914400"/>
+          </a:xfrm>
+          <a:prstGeom prst="rect">
+            <a:avLst/>
+          </a:prstGeom>
+        </p:spPr>
+        <p:style>
+          <a:lnRef idx="2">
+            <a:schemeClr val="accent1">
+              <a:shade val="50000"/>
+            </a:schemeClr>
+          </a:lnRef>
+          <a:fillRef idx="1">
+            <a:schemeClr val="accent1"/>
+          </a:fillRef>
+          <a:effectRef idx="0">
+            <a:schemeClr val="accent1"/>
+          </a:effectRef>
+          <a:fontRef idx="minor">
+            <a:schemeClr val="lt1"/>
+          </a:fontRef>
+        </p:style>
+        <p:txBody>
+          <a:bodyPr rtlCol="0" anchor="ctr"/>
+          <a:lstStyle/>
+          <a:p>
+            <a:pPr algn="ctr"/>
+            <a:r>
+              <a:rPr lang="en-US" dirty="0"/>
+              <a:t>Task services computers</a:t>
+            </a:r>
+          </a:p>
+        </p:txBody>
+      </p:sp>
+      <p:sp>
+        <p:nvSpPr>
+          <p:cNvPr id="15" name="Rectangle 14">
+            <a:extLst>
+              <a:ext uri="{FF2B5EF4-FFF2-40B4-BE49-F238E27FC236}">
+                <a16:creationId xmlns:a16="http://schemas.microsoft.com/office/drawing/2014/main" id="{8B0FEF72-DEAF-FB4C-870D-F68BC62535EA}"/>
+              </a:ext>
+            </a:extLst>
+          </p:cNvPr>
+          <p:cNvSpPr/>
+          <p:nvPr/>
+        </p:nvSpPr>
+        <p:spPr>
+          <a:xfrm>
+            <a:off x="3514726" y="2357438"/>
+            <a:ext cx="1200148" cy="914400"/>
+          </a:xfrm>
+          <a:prstGeom prst="rect">
+            <a:avLst/>
+          </a:prstGeom>
+        </p:spPr>
+        <p:style>
+          <a:lnRef idx="2">
+            <a:schemeClr val="accent1">
+              <a:shade val="50000"/>
+            </a:schemeClr>
+          </a:lnRef>
+          <a:fillRef idx="1">
+            <a:schemeClr val="accent1"/>
+          </a:fillRef>
+          <a:effectRef idx="0">
+            <a:schemeClr val="accent1"/>
+          </a:effectRef>
+          <a:fontRef idx="minor">
+            <a:schemeClr val="lt1"/>
+          </a:fontRef>
+        </p:style>
+        <p:txBody>
+          <a:bodyPr rtlCol="0" anchor="ctr"/>
+          <a:lstStyle/>
+          <a:p>
+            <a:pPr algn="ctr"/>
+            <a:r>
+              <a:rPr lang="en-US" dirty="0"/>
+              <a:t>Project Services computer</a:t>
+            </a:r>
+          </a:p>
+        </p:txBody>
+      </p:sp>
+      <p:sp>
+        <p:nvSpPr>
+          <p:cNvPr id="16" name="Rectangle 15">
+            <a:extLst>
+              <a:ext uri="{FF2B5EF4-FFF2-40B4-BE49-F238E27FC236}">
+                <a16:creationId xmlns:a16="http://schemas.microsoft.com/office/drawing/2014/main" id="{EC3C1C89-2517-3F4E-9703-16140C41C69F}"/>
+              </a:ext>
+            </a:extLst>
+          </p:cNvPr>
+          <p:cNvSpPr/>
+          <p:nvPr/>
+        </p:nvSpPr>
+        <p:spPr>
+          <a:xfrm>
+            <a:off x="3514726" y="4333875"/>
+            <a:ext cx="1200148" cy="914400"/>
+          </a:xfrm>
+          <a:prstGeom prst="rect">
+            <a:avLst/>
+          </a:prstGeom>
+        </p:spPr>
+        <p:style>
+          <a:lnRef idx="2">
+            <a:schemeClr val="accent1">
+              <a:shade val="50000"/>
+            </a:schemeClr>
+          </a:lnRef>
+          <a:fillRef idx="1">
+            <a:schemeClr val="accent1"/>
+          </a:fillRef>
+          <a:effectRef idx="0">
+            <a:schemeClr val="accent1"/>
+          </a:effectRef>
+          <a:fontRef idx="minor">
+            <a:schemeClr val="lt1"/>
+          </a:fontRef>
+        </p:style>
+        <p:txBody>
+          <a:bodyPr rtlCol="0" anchor="ctr"/>
+          <a:lstStyle/>
+          <a:p>
+            <a:pPr algn="ctr"/>
+            <a:r>
+              <a:rPr lang="en-US" dirty="0"/>
+              <a:t>Employee Services computer</a:t>
+            </a:r>
+          </a:p>
+        </p:txBody>
+      </p:sp>
+      <p:cxnSp>
+        <p:nvCxnSpPr>
+          <p:cNvPr id="24" name="Straight Connector 23">
+            <a:extLst>
+              <a:ext uri="{FF2B5EF4-FFF2-40B4-BE49-F238E27FC236}">
+                <a16:creationId xmlns:a16="http://schemas.microsoft.com/office/drawing/2014/main" id="{0DCE5D35-2AF6-F849-9000-A4D7C16EF7AA}"/>
+              </a:ext>
+            </a:extLst>
+          </p:cNvPr>
+          <p:cNvCxnSpPr/>
+          <p:nvPr/>
+        </p:nvCxnSpPr>
+        <p:spPr>
+          <a:xfrm>
+            <a:off x="9301163" y="0"/>
+            <a:ext cx="0" cy="6858000"/>
+          </a:xfrm>
+          <a:prstGeom prst="line">
+            <a:avLst/>
+          </a:prstGeom>
+        </p:spPr>
+        <p:style>
+          <a:lnRef idx="1">
+            <a:schemeClr val="accent1"/>
+          </a:lnRef>
+          <a:fillRef idx="0">
+            <a:schemeClr val="accent1"/>
+          </a:fillRef>
+          <a:effectRef idx="0">
+            <a:schemeClr val="accent1"/>
+          </a:effectRef>
+          <a:fontRef idx="minor">
+            <a:schemeClr val="tx1"/>
+          </a:fontRef>
+        </p:style>
+      </p:cxnSp>
+      <p:sp>
+        <p:nvSpPr>
+          <p:cNvPr id="25" name="Rectangle 24">
+            <a:extLst>
+              <a:ext uri="{FF2B5EF4-FFF2-40B4-BE49-F238E27FC236}">
+                <a16:creationId xmlns:a16="http://schemas.microsoft.com/office/drawing/2014/main" id="{DA49C6A1-62AC-6B48-99EC-7BC7548D546C}"/>
+              </a:ext>
+            </a:extLst>
+          </p:cNvPr>
+          <p:cNvSpPr/>
+          <p:nvPr/>
+        </p:nvSpPr>
+        <p:spPr>
+          <a:xfrm>
+            <a:off x="5929310" y="823912"/>
+            <a:ext cx="3028950" cy="4729163"/>
+          </a:xfrm>
+          <a:prstGeom prst="rect">
+            <a:avLst/>
+          </a:prstGeom>
+        </p:spPr>
+        <p:style>
+          <a:lnRef idx="2">
+            <a:schemeClr val="accent1">
+              <a:shade val="50000"/>
+            </a:schemeClr>
+          </a:lnRef>
+          <a:fillRef idx="1">
+            <a:schemeClr val="accent1"/>
+          </a:fillRef>
+          <a:effectRef idx="0">
+            <a:schemeClr val="accent1"/>
+          </a:effectRef>
+          <a:fontRef idx="minor">
+            <a:schemeClr val="lt1"/>
+          </a:fontRef>
+        </p:style>
+        <p:txBody>
+          <a:bodyPr rtlCol="0" anchor="ctr"/>
+          <a:lstStyle/>
+          <a:p>
+            <a:pPr algn="ctr"/>
+            <a:r>
+              <a:rPr lang="en-US" dirty="0"/>
+              <a:t>Angular app</a:t>
+            </a:r>
+          </a:p>
+        </p:txBody>
+      </p:sp>
+      <p:cxnSp>
+        <p:nvCxnSpPr>
+          <p:cNvPr id="27" name="Straight Connector 26">
+            <a:extLst>
+              <a:ext uri="{FF2B5EF4-FFF2-40B4-BE49-F238E27FC236}">
+                <a16:creationId xmlns:a16="http://schemas.microsoft.com/office/drawing/2014/main" id="{27217797-6FA2-914A-A533-DAEEE9AB1709}"/>
+              </a:ext>
+            </a:extLst>
+          </p:cNvPr>
+          <p:cNvCxnSpPr>
+            <a:stCxn id="25" idx="1"/>
+            <a:endCxn id="14" idx="3"/>
+          </p:cNvCxnSpPr>
+          <p:nvPr/>
+        </p:nvCxnSpPr>
+        <p:spPr>
+          <a:xfrm flipH="1" flipV="1">
+            <a:off x="4714874" y="1295399"/>
+            <a:ext cx="1214436" cy="1893095"/>
+          </a:xfrm>
+          <a:prstGeom prst="line">
+            <a:avLst/>
+          </a:prstGeom>
+        </p:spPr>
+        <p:style>
+          <a:lnRef idx="1">
+            <a:schemeClr val="accent1"/>
+          </a:lnRef>
+          <a:fillRef idx="0">
+            <a:schemeClr val="accent1"/>
+          </a:fillRef>
+          <a:effectRef idx="0">
+            <a:schemeClr val="accent1"/>
+          </a:effectRef>
+          <a:fontRef idx="minor">
+            <a:schemeClr val="tx1"/>
+          </a:fontRef>
+        </p:style>
+      </p:cxnSp>
+      <p:cxnSp>
+        <p:nvCxnSpPr>
+          <p:cNvPr id="29" name="Straight Connector 28">
+            <a:extLst>
+              <a:ext uri="{FF2B5EF4-FFF2-40B4-BE49-F238E27FC236}">
+                <a16:creationId xmlns:a16="http://schemas.microsoft.com/office/drawing/2014/main" id="{B4F23E80-6846-D34E-AF00-5D11F85242D7}"/>
+              </a:ext>
+            </a:extLst>
+          </p:cNvPr>
+          <p:cNvCxnSpPr>
+            <a:stCxn id="25" idx="1"/>
+            <a:endCxn id="15" idx="3"/>
+          </p:cNvCxnSpPr>
+          <p:nvPr/>
+        </p:nvCxnSpPr>
+        <p:spPr>
+          <a:xfrm flipH="1" flipV="1">
+            <a:off x="4714874" y="2814638"/>
+            <a:ext cx="1214436" cy="373856"/>
+          </a:xfrm>
+          <a:prstGeom prst="line">
+            <a:avLst/>
+          </a:prstGeom>
+        </p:spPr>
+        <p:style>
+          <a:lnRef idx="1">
+            <a:schemeClr val="accent1"/>
+          </a:lnRef>
+          <a:fillRef idx="0">
+            <a:schemeClr val="accent1"/>
+          </a:fillRef>
+          <a:effectRef idx="0">
+            <a:schemeClr val="accent1"/>
+          </a:effectRef>
+          <a:fontRef idx="minor">
+            <a:schemeClr val="tx1"/>
+          </a:fontRef>
+        </p:style>
+      </p:cxnSp>
+      <p:cxnSp>
+        <p:nvCxnSpPr>
+          <p:cNvPr id="31" name="Straight Connector 30">
+            <a:extLst>
+              <a:ext uri="{FF2B5EF4-FFF2-40B4-BE49-F238E27FC236}">
+                <a16:creationId xmlns:a16="http://schemas.microsoft.com/office/drawing/2014/main" id="{78656BB2-A21D-8843-93C2-88A48C3E1C75}"/>
+              </a:ext>
+            </a:extLst>
+          </p:cNvPr>
+          <p:cNvCxnSpPr>
+            <a:stCxn id="25" idx="1"/>
+            <a:endCxn id="16" idx="3"/>
+          </p:cNvCxnSpPr>
+          <p:nvPr/>
+        </p:nvCxnSpPr>
+        <p:spPr>
+          <a:xfrm flipH="1">
+            <a:off x="4714874" y="3188494"/>
+            <a:ext cx="1214436" cy="1602581"/>
+          </a:xfrm>
+          <a:prstGeom prst="line">
+            <a:avLst/>
+          </a:prstGeom>
+        </p:spPr>
+        <p:style>
+          <a:lnRef idx="1">
+            <a:schemeClr val="accent1"/>
+          </a:lnRef>
+          <a:fillRef idx="0">
+            <a:schemeClr val="accent1"/>
+          </a:fillRef>
+          <a:effectRef idx="0">
+            <a:schemeClr val="accent1"/>
+          </a:effectRef>
+          <a:fontRef idx="minor">
+            <a:schemeClr val="tx1"/>
+          </a:fontRef>
+        </p:style>
+      </p:cxnSp>
+      <p:sp>
+        <p:nvSpPr>
+          <p:cNvPr id="32" name="TextBox 31">
+            <a:extLst>
+              <a:ext uri="{FF2B5EF4-FFF2-40B4-BE49-F238E27FC236}">
+                <a16:creationId xmlns:a16="http://schemas.microsoft.com/office/drawing/2014/main" id="{7361025A-CB90-FD41-92B0-0EE1E5B95EEA}"/>
+              </a:ext>
+            </a:extLst>
+          </p:cNvPr>
+          <p:cNvSpPr txBox="1"/>
+          <p:nvPr/>
+        </p:nvSpPr>
+        <p:spPr>
+          <a:xfrm>
+            <a:off x="4964602" y="1567933"/>
+            <a:ext cx="1243610" cy="369332"/>
+          </a:xfrm>
+          <a:prstGeom prst="rect">
+            <a:avLst/>
+          </a:prstGeom>
+          <a:noFill/>
+        </p:spPr>
+        <p:txBody>
+          <a:bodyPr wrap="none" rtlCol="0">
+            <a:spAutoFit/>
+          </a:bodyPr>
+          <a:lstStyle/>
+          <a:p>
+            <a:r>
+              <a:rPr lang="en-US" dirty="0"/>
+              <a:t>RESTful API</a:t>
+            </a:r>
+          </a:p>
+        </p:txBody>
+      </p:sp>
+      <p:sp>
+        <p:nvSpPr>
+          <p:cNvPr id="33" name="TextBox 32">
+            <a:extLst>
+              <a:ext uri="{FF2B5EF4-FFF2-40B4-BE49-F238E27FC236}">
+                <a16:creationId xmlns:a16="http://schemas.microsoft.com/office/drawing/2014/main" id="{002E2D07-34E0-8947-B8FE-C01D47007DD7}"/>
+              </a:ext>
+            </a:extLst>
+          </p:cNvPr>
+          <p:cNvSpPr txBox="1"/>
+          <p:nvPr/>
+        </p:nvSpPr>
+        <p:spPr>
+          <a:xfrm>
+            <a:off x="4825151" y="2553889"/>
+            <a:ext cx="1243610" cy="369332"/>
+          </a:xfrm>
+          <a:prstGeom prst="rect">
+            <a:avLst/>
+          </a:prstGeom>
+          <a:noFill/>
+        </p:spPr>
+        <p:txBody>
+          <a:bodyPr wrap="none" rtlCol="0">
+            <a:spAutoFit/>
+          </a:bodyPr>
+          <a:lstStyle/>
+          <a:p>
+            <a:r>
+              <a:rPr lang="en-US" dirty="0"/>
+              <a:t>RESTful API</a:t>
+            </a:r>
+          </a:p>
+        </p:txBody>
+      </p:sp>
+      <p:sp>
+        <p:nvSpPr>
+          <p:cNvPr id="34" name="TextBox 33">
+            <a:extLst>
+              <a:ext uri="{FF2B5EF4-FFF2-40B4-BE49-F238E27FC236}">
+                <a16:creationId xmlns:a16="http://schemas.microsoft.com/office/drawing/2014/main" id="{792343AA-D27C-4043-AB3E-43F6881836D8}"/>
+              </a:ext>
+            </a:extLst>
+          </p:cNvPr>
+          <p:cNvSpPr txBox="1"/>
+          <p:nvPr/>
+        </p:nvSpPr>
+        <p:spPr>
+          <a:xfrm>
+            <a:off x="4228502" y="3645694"/>
+            <a:ext cx="1243610" cy="369332"/>
+          </a:xfrm>
+          <a:prstGeom prst="rect">
+            <a:avLst/>
+          </a:prstGeom>
+          <a:noFill/>
+        </p:spPr>
+        <p:txBody>
+          <a:bodyPr wrap="none" rtlCol="0">
+            <a:spAutoFit/>
+          </a:bodyPr>
+          <a:lstStyle/>
+          <a:p>
+            <a:r>
+              <a:rPr lang="en-US" dirty="0"/>
+              <a:t>RESTful API</a:t>
+            </a:r>
+          </a:p>
+        </p:txBody>
+      </p:sp>
+      <p:sp>
+        <p:nvSpPr>
+          <p:cNvPr id="35" name="TextBox 34">
+            <a:extLst>
+              <a:ext uri="{FF2B5EF4-FFF2-40B4-BE49-F238E27FC236}">
+                <a16:creationId xmlns:a16="http://schemas.microsoft.com/office/drawing/2014/main" id="{B47DD178-BD77-B944-BA33-898BB0B1BB23}"/>
+              </a:ext>
+            </a:extLst>
+          </p:cNvPr>
+          <p:cNvSpPr txBox="1"/>
+          <p:nvPr/>
+        </p:nvSpPr>
+        <p:spPr>
+          <a:xfrm>
+            <a:off x="4062464" y="138885"/>
+            <a:ext cx="1523943" cy="369332"/>
+          </a:xfrm>
+          <a:prstGeom prst="rect">
+            <a:avLst/>
+          </a:prstGeom>
+          <a:noFill/>
+        </p:spPr>
+        <p:txBody>
+          <a:bodyPr wrap="none" rtlCol="0">
+            <a:spAutoFit/>
+          </a:bodyPr>
+          <a:lstStyle/>
+          <a:p>
+            <a:r>
+              <a:rPr lang="en-US" dirty="0"/>
+              <a:t>JSON FORMAT</a:t>
+            </a:r>
+          </a:p>
+        </p:txBody>
+      </p:sp>
+    </p:spTree>
+    <p:extLst>
+      <p:ext uri="{BB962C8B-B14F-4D97-AF65-F5344CB8AC3E}">
+        <p14:creationId xmlns:p14="http://schemas.microsoft.com/office/powerpoint/2010/main" val="1802511256"/>
+      </p:ext>
+    </p:extLst>
+  </p:cSld>
+  <p:clrMapOvr>
+    <a:masterClrMapping/>
+  </p:clrMapOvr>
+</p:sld>
+</file>
+
+<file path=ppt/slides/slide3.xml><?xml version="1.0" encoding="utf-8"?>
+<p:sld xmlns:a="http://schemas.openxmlformats.org/drawingml/2006/main" xmlns:r="http://schemas.openxmlformats.org/officeDocument/2006/relationships" xmlns:p="http://schemas.openxmlformats.org/presentationml/2006/main">
+  <p:cSld>
+    <p:spTree>
+      <p:nvGrpSpPr>
+        <p:cNvPr id="1" name=""/>
+        <p:cNvGrpSpPr/>
+        <p:nvPr/>
+      </p:nvGrpSpPr>
+      <p:grpSpPr>
+        <a:xfrm>
+          <a:off x="0" y="0"/>
+          <a:ext cx="0" cy="0"/>
+          <a:chOff x="0" y="0"/>
+          <a:chExt cx="0" cy="0"/>
+        </a:xfrm>
+      </p:grpSpPr>
+      <p:cxnSp>
+        <p:nvCxnSpPr>
+          <p:cNvPr id="7" name="Straight Connector 6">
+            <a:extLst>
+              <a:ext uri="{FF2B5EF4-FFF2-40B4-BE49-F238E27FC236}">
+                <a16:creationId xmlns:a16="http://schemas.microsoft.com/office/drawing/2014/main" id="{77C28D95-4ACE-2A43-9065-B9937C3A023D}"/>
+              </a:ext>
+            </a:extLst>
+          </p:cNvPr>
+          <p:cNvCxnSpPr/>
+          <p:nvPr/>
+        </p:nvCxnSpPr>
+        <p:spPr>
+          <a:xfrm>
+            <a:off x="2300288" y="0"/>
+            <a:ext cx="0" cy="6858000"/>
+          </a:xfrm>
+          <a:prstGeom prst="line">
+            <a:avLst/>
+          </a:prstGeom>
+        </p:spPr>
+        <p:style>
+          <a:lnRef idx="1">
+            <a:schemeClr val="accent1"/>
+          </a:lnRef>
+          <a:fillRef idx="0">
+            <a:schemeClr val="accent1"/>
+          </a:fillRef>
+          <a:effectRef idx="0">
+            <a:schemeClr val="accent1"/>
+          </a:effectRef>
+          <a:fontRef idx="minor">
+            <a:schemeClr val="tx1"/>
+          </a:fontRef>
+        </p:style>
+      </p:cxnSp>
+      <p:sp>
+        <p:nvSpPr>
+          <p:cNvPr id="8" name="Rectangle 7">
+            <a:extLst>
+              <a:ext uri="{FF2B5EF4-FFF2-40B4-BE49-F238E27FC236}">
+                <a16:creationId xmlns:a16="http://schemas.microsoft.com/office/drawing/2014/main" id="{E7B06E62-3F64-5D41-82FE-669D5431DFE0}"/>
+              </a:ext>
+            </a:extLst>
+          </p:cNvPr>
+          <p:cNvSpPr/>
+          <p:nvPr/>
+        </p:nvSpPr>
+        <p:spPr>
+          <a:xfrm>
+            <a:off x="681037" y="461962"/>
+            <a:ext cx="1119187" cy="914400"/>
+          </a:xfrm>
+          <a:prstGeom prst="rect">
+            <a:avLst/>
+          </a:prstGeom>
+        </p:spPr>
+        <p:style>
+          <a:lnRef idx="2">
+            <a:schemeClr val="accent1">
+              <a:shade val="50000"/>
+            </a:schemeClr>
+          </a:lnRef>
+          <a:fillRef idx="1">
+            <a:schemeClr val="accent1"/>
+          </a:fillRef>
+          <a:effectRef idx="0">
+            <a:schemeClr val="accent1"/>
+          </a:effectRef>
+          <a:fontRef idx="minor">
+            <a:schemeClr val="lt1"/>
+          </a:fontRef>
+        </p:style>
+        <p:txBody>
+          <a:bodyPr rtlCol="0" anchor="ctr"/>
+          <a:lstStyle/>
+          <a:p>
+            <a:pPr algn="ctr"/>
+            <a:r>
+              <a:rPr lang="en-US" dirty="0"/>
+              <a:t>Java Common</a:t>
+            </a:r>
+          </a:p>
+        </p:txBody>
+      </p:sp>
+      <p:sp>
+        <p:nvSpPr>
+          <p:cNvPr id="9" name="Rectangle 8">
+            <a:extLst>
+              <a:ext uri="{FF2B5EF4-FFF2-40B4-BE49-F238E27FC236}">
+                <a16:creationId xmlns:a16="http://schemas.microsoft.com/office/drawing/2014/main" id="{2C9BF2A5-4605-7143-9549-527160F4A506}"/>
+              </a:ext>
+            </a:extLst>
+          </p:cNvPr>
+          <p:cNvSpPr/>
+          <p:nvPr/>
+        </p:nvSpPr>
+        <p:spPr>
+          <a:xfrm>
+            <a:off x="723901" y="5095875"/>
+            <a:ext cx="914400" cy="914400"/>
+          </a:xfrm>
+          <a:prstGeom prst="rect">
+            <a:avLst/>
+          </a:prstGeom>
+        </p:spPr>
+        <p:style>
+          <a:lnRef idx="2">
+            <a:schemeClr val="accent1">
+              <a:shade val="50000"/>
+            </a:schemeClr>
+          </a:lnRef>
+          <a:fillRef idx="1">
+            <a:schemeClr val="accent1"/>
+          </a:fillRef>
+          <a:effectRef idx="0">
+            <a:schemeClr val="accent1"/>
+          </a:effectRef>
+          <a:fontRef idx="minor">
+            <a:schemeClr val="lt1"/>
+          </a:fontRef>
+        </p:style>
+        <p:txBody>
+          <a:bodyPr rtlCol="0" anchor="ctr"/>
+          <a:lstStyle/>
+          <a:p>
+            <a:pPr algn="ctr"/>
+            <a:endParaRPr lang="en-US" dirty="0"/>
+          </a:p>
+        </p:txBody>
+      </p:sp>
+      <p:sp>
+        <p:nvSpPr>
+          <p:cNvPr id="10" name="Rectangle 9">
+            <a:extLst>
+              <a:ext uri="{FF2B5EF4-FFF2-40B4-BE49-F238E27FC236}">
+                <a16:creationId xmlns:a16="http://schemas.microsoft.com/office/drawing/2014/main" id="{E2D97411-0951-4E4C-848F-3B6F268272CA}"/>
+              </a:ext>
+            </a:extLst>
+          </p:cNvPr>
+          <p:cNvSpPr/>
+          <p:nvPr/>
+        </p:nvSpPr>
+        <p:spPr>
+          <a:xfrm>
+            <a:off x="723900" y="3419475"/>
+            <a:ext cx="1076323" cy="914400"/>
+          </a:xfrm>
+          <a:prstGeom prst="rect">
+            <a:avLst/>
+          </a:prstGeom>
+        </p:spPr>
+        <p:style>
+          <a:lnRef idx="2">
+            <a:schemeClr val="accent1">
+              <a:shade val="50000"/>
+            </a:schemeClr>
+          </a:lnRef>
+          <a:fillRef idx="1">
+            <a:schemeClr val="accent1"/>
+          </a:fillRef>
+          <a:effectRef idx="0">
+            <a:schemeClr val="accent1"/>
+          </a:effectRef>
+          <a:fontRef idx="minor">
+            <a:schemeClr val="lt1"/>
+          </a:fontRef>
+        </p:style>
+        <p:txBody>
+          <a:bodyPr rtlCol="0" anchor="ctr"/>
+          <a:lstStyle/>
+          <a:p>
+            <a:pPr algn="ctr"/>
+            <a:r>
+              <a:rPr lang="en-US" dirty="0"/>
+              <a:t>Java Services</a:t>
+            </a:r>
+          </a:p>
+        </p:txBody>
+      </p:sp>
+      <p:sp>
+        <p:nvSpPr>
+          <p:cNvPr id="11" name="Rectangle 10">
+            <a:extLst>
+              <a:ext uri="{FF2B5EF4-FFF2-40B4-BE49-F238E27FC236}">
+                <a16:creationId xmlns:a16="http://schemas.microsoft.com/office/drawing/2014/main" id="{18F53F01-DBDC-A947-A534-22693B2F1F8E}"/>
+              </a:ext>
+            </a:extLst>
+          </p:cNvPr>
+          <p:cNvSpPr/>
+          <p:nvPr/>
+        </p:nvSpPr>
+        <p:spPr>
+          <a:xfrm>
+            <a:off x="681038" y="2028825"/>
+            <a:ext cx="914400" cy="914400"/>
+          </a:xfrm>
+          <a:prstGeom prst="rect">
+            <a:avLst/>
+          </a:prstGeom>
+        </p:spPr>
+        <p:style>
+          <a:lnRef idx="2">
+            <a:schemeClr val="accent1">
+              <a:shade val="50000"/>
+            </a:schemeClr>
+          </a:lnRef>
+          <a:fillRef idx="1">
+            <a:schemeClr val="accent1"/>
+          </a:fillRef>
+          <a:effectRef idx="0">
+            <a:schemeClr val="accent1"/>
+          </a:effectRef>
+          <a:fontRef idx="minor">
+            <a:schemeClr val="lt1"/>
+          </a:fontRef>
+        </p:style>
+        <p:txBody>
+          <a:bodyPr rtlCol="0" anchor="ctr"/>
+          <a:lstStyle/>
+          <a:p>
+            <a:pPr algn="ctr"/>
+            <a:r>
+              <a:rPr lang="en-US" dirty="0"/>
+              <a:t>Java DB</a:t>
+            </a:r>
+          </a:p>
+        </p:txBody>
+      </p:sp>
+      <p:cxnSp>
+        <p:nvCxnSpPr>
+          <p:cNvPr id="13" name="Straight Connector 12">
+            <a:extLst>
+              <a:ext uri="{FF2B5EF4-FFF2-40B4-BE49-F238E27FC236}">
+                <a16:creationId xmlns:a16="http://schemas.microsoft.com/office/drawing/2014/main" id="{09704FCA-8DAC-F643-9A38-5640FD097220}"/>
+              </a:ext>
+            </a:extLst>
+          </p:cNvPr>
+          <p:cNvCxnSpPr/>
+          <p:nvPr/>
+        </p:nvCxnSpPr>
+        <p:spPr>
+          <a:xfrm>
+            <a:off x="5643563" y="0"/>
+            <a:ext cx="0" cy="6858000"/>
+          </a:xfrm>
+          <a:prstGeom prst="line">
+            <a:avLst/>
+          </a:prstGeom>
+        </p:spPr>
+        <p:style>
+          <a:lnRef idx="1">
+            <a:schemeClr val="accent1"/>
+          </a:lnRef>
+          <a:fillRef idx="0">
+            <a:schemeClr val="accent1"/>
+          </a:fillRef>
+          <a:effectRef idx="0">
+            <a:schemeClr val="accent1"/>
+          </a:effectRef>
+          <a:fontRef idx="minor">
+            <a:schemeClr val="tx1"/>
+          </a:fontRef>
+        </p:style>
+      </p:cxnSp>
+      <p:sp>
+        <p:nvSpPr>
+          <p:cNvPr id="14" name="Rectangle 13">
+            <a:extLst>
+              <a:ext uri="{FF2B5EF4-FFF2-40B4-BE49-F238E27FC236}">
+                <a16:creationId xmlns:a16="http://schemas.microsoft.com/office/drawing/2014/main" id="{36837305-3F38-B847-ADE0-55D78933EB7A}"/>
+              </a:ext>
+            </a:extLst>
+          </p:cNvPr>
+          <p:cNvSpPr/>
+          <p:nvPr/>
+        </p:nvSpPr>
+        <p:spPr>
+          <a:xfrm>
+            <a:off x="3514725" y="838199"/>
+            <a:ext cx="1200149" cy="914400"/>
+          </a:xfrm>
+          <a:prstGeom prst="rect">
+            <a:avLst/>
+          </a:prstGeom>
+        </p:spPr>
+        <p:style>
+          <a:lnRef idx="2">
+            <a:schemeClr val="accent1">
+              <a:shade val="50000"/>
+            </a:schemeClr>
+          </a:lnRef>
+          <a:fillRef idx="1">
+            <a:schemeClr val="accent1"/>
+          </a:fillRef>
+          <a:effectRef idx="0">
+            <a:schemeClr val="accent1"/>
+          </a:effectRef>
+          <a:fontRef idx="minor">
+            <a:schemeClr val="lt1"/>
+          </a:fontRef>
+        </p:style>
+        <p:txBody>
+          <a:bodyPr rtlCol="0" anchor="ctr"/>
+          <a:lstStyle/>
+          <a:p>
+            <a:pPr algn="ctr"/>
+            <a:r>
+              <a:rPr lang="en-US" dirty="0"/>
+              <a:t>Task services computers</a:t>
+            </a:r>
+          </a:p>
+        </p:txBody>
+      </p:sp>
+      <p:sp>
+        <p:nvSpPr>
+          <p:cNvPr id="15" name="Rectangle 14">
+            <a:extLst>
+              <a:ext uri="{FF2B5EF4-FFF2-40B4-BE49-F238E27FC236}">
+                <a16:creationId xmlns:a16="http://schemas.microsoft.com/office/drawing/2014/main" id="{8B0FEF72-DEAF-FB4C-870D-F68BC62535EA}"/>
+              </a:ext>
+            </a:extLst>
+          </p:cNvPr>
+          <p:cNvSpPr/>
+          <p:nvPr/>
+        </p:nvSpPr>
+        <p:spPr>
+          <a:xfrm>
+            <a:off x="3514726" y="2357438"/>
+            <a:ext cx="1200148" cy="914400"/>
+          </a:xfrm>
+          <a:prstGeom prst="rect">
+            <a:avLst/>
+          </a:prstGeom>
+        </p:spPr>
+        <p:style>
+          <a:lnRef idx="2">
+            <a:schemeClr val="accent1">
+              <a:shade val="50000"/>
+            </a:schemeClr>
+          </a:lnRef>
+          <a:fillRef idx="1">
+            <a:schemeClr val="accent1"/>
+          </a:fillRef>
+          <a:effectRef idx="0">
+            <a:schemeClr val="accent1"/>
+          </a:effectRef>
+          <a:fontRef idx="minor">
+            <a:schemeClr val="lt1"/>
+          </a:fontRef>
+        </p:style>
+        <p:txBody>
+          <a:bodyPr rtlCol="0" anchor="ctr"/>
+          <a:lstStyle/>
+          <a:p>
+            <a:pPr algn="ctr"/>
+            <a:r>
+              <a:rPr lang="en-US" dirty="0"/>
+              <a:t>Project Services computer</a:t>
+            </a:r>
+          </a:p>
+        </p:txBody>
+      </p:sp>
+      <p:sp>
+        <p:nvSpPr>
+          <p:cNvPr id="16" name="Rectangle 15">
+            <a:extLst>
+              <a:ext uri="{FF2B5EF4-FFF2-40B4-BE49-F238E27FC236}">
+                <a16:creationId xmlns:a16="http://schemas.microsoft.com/office/drawing/2014/main" id="{EC3C1C89-2517-3F4E-9703-16140C41C69F}"/>
+              </a:ext>
+            </a:extLst>
+          </p:cNvPr>
+          <p:cNvSpPr/>
+          <p:nvPr/>
+        </p:nvSpPr>
+        <p:spPr>
+          <a:xfrm>
+            <a:off x="3514726" y="4333875"/>
+            <a:ext cx="1200148" cy="914400"/>
+          </a:xfrm>
+          <a:prstGeom prst="rect">
+            <a:avLst/>
+          </a:prstGeom>
+        </p:spPr>
+        <p:style>
+          <a:lnRef idx="2">
+            <a:schemeClr val="accent1">
+              <a:shade val="50000"/>
+            </a:schemeClr>
+          </a:lnRef>
+          <a:fillRef idx="1">
+            <a:schemeClr val="accent1"/>
+          </a:fillRef>
+          <a:effectRef idx="0">
+            <a:schemeClr val="accent1"/>
+          </a:effectRef>
+          <a:fontRef idx="minor">
+            <a:schemeClr val="lt1"/>
+          </a:fontRef>
+        </p:style>
+        <p:txBody>
+          <a:bodyPr rtlCol="0" anchor="ctr"/>
+          <a:lstStyle/>
+          <a:p>
+            <a:pPr algn="ctr"/>
+            <a:r>
+              <a:rPr lang="en-US" dirty="0"/>
+              <a:t>Employee Services computer</a:t>
+            </a:r>
+          </a:p>
+        </p:txBody>
+      </p:sp>
+      <p:pic>
+        <p:nvPicPr>
+          <p:cNvPr id="18" name="Picture 17">
+            <a:extLst>
+              <a:ext uri="{FF2B5EF4-FFF2-40B4-BE49-F238E27FC236}">
+                <a16:creationId xmlns:a16="http://schemas.microsoft.com/office/drawing/2014/main" id="{9D2114EB-5775-8F44-8ADA-131233BA135D}"/>
+              </a:ext>
+            </a:extLst>
+          </p:cNvPr>
+          <p:cNvPicPr>
+            <a:picLocks noChangeAspect="1"/>
+          </p:cNvPicPr>
+          <p:nvPr/>
+        </p:nvPicPr>
+        <p:blipFill>
+          <a:blip r:embed="rId2"/>
+          <a:stretch>
+            <a:fillRect/>
+          </a:stretch>
+        </p:blipFill>
+        <p:spPr>
+          <a:xfrm>
+            <a:off x="5014911" y="4238625"/>
+            <a:ext cx="1828800" cy="1104900"/>
+          </a:xfrm>
+          <a:prstGeom prst="rect">
+            <a:avLst/>
+          </a:prstGeom>
+        </p:spPr>
+      </p:pic>
+      <p:pic>
+        <p:nvPicPr>
+          <p:cNvPr id="19" name="Picture 18">
+            <a:extLst>
+              <a:ext uri="{FF2B5EF4-FFF2-40B4-BE49-F238E27FC236}">
+                <a16:creationId xmlns:a16="http://schemas.microsoft.com/office/drawing/2014/main" id="{72F809B1-99D4-B347-B743-77320A27F0D9}"/>
+              </a:ext>
+            </a:extLst>
+          </p:cNvPr>
+          <p:cNvPicPr>
+            <a:picLocks noChangeAspect="1"/>
+          </p:cNvPicPr>
+          <p:nvPr/>
+        </p:nvPicPr>
+        <p:blipFill>
+          <a:blip r:embed="rId2"/>
+          <a:stretch>
+            <a:fillRect/>
+          </a:stretch>
+        </p:blipFill>
+        <p:spPr>
+          <a:xfrm>
+            <a:off x="5014911" y="2376488"/>
+            <a:ext cx="1828800" cy="1104900"/>
+          </a:xfrm>
+          <a:prstGeom prst="rect">
+            <a:avLst/>
+          </a:prstGeom>
+        </p:spPr>
+      </p:pic>
+      <p:pic>
+        <p:nvPicPr>
+          <p:cNvPr id="20" name="Picture 19">
+            <a:extLst>
+              <a:ext uri="{FF2B5EF4-FFF2-40B4-BE49-F238E27FC236}">
+                <a16:creationId xmlns:a16="http://schemas.microsoft.com/office/drawing/2014/main" id="{AADD9965-355A-0840-A34F-01F66EE610F0}"/>
+              </a:ext>
+            </a:extLst>
+          </p:cNvPr>
+          <p:cNvPicPr>
+            <a:picLocks noChangeAspect="1"/>
+          </p:cNvPicPr>
+          <p:nvPr/>
+        </p:nvPicPr>
+        <p:blipFill>
+          <a:blip r:embed="rId2"/>
+          <a:stretch>
+            <a:fillRect/>
+          </a:stretch>
+        </p:blipFill>
+        <p:spPr>
+          <a:xfrm>
+            <a:off x="4729163" y="742949"/>
+            <a:ext cx="1385887" cy="837307"/>
+          </a:xfrm>
+          <a:prstGeom prst="rect">
+            <a:avLst/>
+          </a:prstGeom>
+        </p:spPr>
+      </p:pic>
+      <p:pic>
+        <p:nvPicPr>
+          <p:cNvPr id="21" name="Picture 20">
+            <a:extLst>
+              <a:ext uri="{FF2B5EF4-FFF2-40B4-BE49-F238E27FC236}">
+                <a16:creationId xmlns:a16="http://schemas.microsoft.com/office/drawing/2014/main" id="{D55D76C5-541E-D947-BC45-8C77943E072D}"/>
+              </a:ext>
+            </a:extLst>
+          </p:cNvPr>
+          <p:cNvPicPr>
+            <a:picLocks noChangeAspect="1"/>
+          </p:cNvPicPr>
+          <p:nvPr/>
+        </p:nvPicPr>
+        <p:blipFill>
+          <a:blip r:embed="rId2"/>
+          <a:stretch>
+            <a:fillRect/>
+          </a:stretch>
+        </p:blipFill>
+        <p:spPr>
+          <a:xfrm>
+            <a:off x="2085971" y="817958"/>
+            <a:ext cx="1517429" cy="916780"/>
+          </a:xfrm>
+          <a:prstGeom prst="rect">
+            <a:avLst/>
+          </a:prstGeom>
+        </p:spPr>
+      </p:pic>
+      <p:pic>
+        <p:nvPicPr>
+          <p:cNvPr id="22" name="Picture 21">
+            <a:extLst>
+              <a:ext uri="{FF2B5EF4-FFF2-40B4-BE49-F238E27FC236}">
+                <a16:creationId xmlns:a16="http://schemas.microsoft.com/office/drawing/2014/main" id="{82E9B6DE-940E-6F4E-BA11-6082EC036EAF}"/>
+              </a:ext>
+            </a:extLst>
+          </p:cNvPr>
+          <p:cNvPicPr>
+            <a:picLocks noChangeAspect="1"/>
+          </p:cNvPicPr>
+          <p:nvPr/>
+        </p:nvPicPr>
+        <p:blipFill>
+          <a:blip r:embed="rId2"/>
+          <a:stretch>
+            <a:fillRect/>
+          </a:stretch>
+        </p:blipFill>
+        <p:spPr>
+          <a:xfrm>
+            <a:off x="3239074" y="-382194"/>
+            <a:ext cx="1854415" cy="1120376"/>
+          </a:xfrm>
+          <a:prstGeom prst="rect">
+            <a:avLst/>
+          </a:prstGeom>
+        </p:spPr>
+      </p:pic>
+    </p:spTree>
+    <p:extLst>
+      <p:ext uri="{BB962C8B-B14F-4D97-AF65-F5344CB8AC3E}">
+        <p14:creationId xmlns:p14="http://schemas.microsoft.com/office/powerpoint/2010/main" val="2501416967"/>
+      </p:ext>
+    </p:extLst>
+  </p:cSld>
+  <p:clrMapOvr>
+    <a:masterClrMapping/>
+  </p:clrMapOvr>
+</p:sld>
+</file>
+
+<file path=ppt/slides/slide4.xml><?xml version="1.0" encoding="utf-8"?>
+<p:sld xmlns:a="http://schemas.openxmlformats.org/drawingml/2006/main" xmlns:r="http://schemas.openxmlformats.org/officeDocument/2006/relationships" xmlns:p="http://schemas.openxmlformats.org/presentationml/2006/main">
+  <p:cSld>
+    <p:spTree>
+      <p:nvGrpSpPr>
+        <p:cNvPr id="1" name=""/>
+        <p:cNvGrpSpPr/>
+        <p:nvPr/>
+      </p:nvGrpSpPr>
+      <p:grpSpPr>
+        <a:xfrm>
+          <a:off x="0" y="0"/>
+          <a:ext cx="0" cy="0"/>
+          <a:chOff x="0" y="0"/>
+          <a:chExt cx="0" cy="0"/>
+        </a:xfrm>
+      </p:grpSpPr>
+      <p:cxnSp>
+        <p:nvCxnSpPr>
+          <p:cNvPr id="5" name="Straight Connector 4">
+            <a:extLst>
+              <a:ext uri="{FF2B5EF4-FFF2-40B4-BE49-F238E27FC236}">
+                <a16:creationId xmlns:a16="http://schemas.microsoft.com/office/drawing/2014/main" id="{A0ADB48F-34F8-5843-BE6B-675DF0266786}"/>
+              </a:ext>
+            </a:extLst>
+          </p:cNvPr>
+          <p:cNvCxnSpPr/>
+          <p:nvPr/>
+        </p:nvCxnSpPr>
+        <p:spPr>
+          <a:xfrm>
+            <a:off x="0" y="3871913"/>
+            <a:ext cx="12192000" cy="0"/>
+          </a:xfrm>
+          <a:prstGeom prst="line">
+            <a:avLst/>
+          </a:prstGeom>
+        </p:spPr>
+        <p:style>
+          <a:lnRef idx="1">
+            <a:schemeClr val="accent1"/>
+          </a:lnRef>
+          <a:fillRef idx="0">
+            <a:schemeClr val="accent1"/>
+          </a:fillRef>
+          <a:effectRef idx="0">
+            <a:schemeClr val="accent1"/>
+          </a:effectRef>
+          <a:fontRef idx="minor">
+            <a:schemeClr val="tx1"/>
+          </a:fontRef>
+        </p:style>
+      </p:cxnSp>
+      <p:sp>
+        <p:nvSpPr>
+          <p:cNvPr id="6" name="TextBox 5">
+            <a:extLst>
+              <a:ext uri="{FF2B5EF4-FFF2-40B4-BE49-F238E27FC236}">
+                <a16:creationId xmlns:a16="http://schemas.microsoft.com/office/drawing/2014/main" id="{CD10FF73-E9C9-0B48-9D22-E199D00B1136}"/>
+              </a:ext>
+            </a:extLst>
+          </p:cNvPr>
+          <p:cNvSpPr txBox="1"/>
+          <p:nvPr/>
+        </p:nvSpPr>
+        <p:spPr>
+          <a:xfrm>
+            <a:off x="0" y="3502581"/>
+            <a:ext cx="713657" cy="369332"/>
+          </a:xfrm>
+          <a:prstGeom prst="rect">
+            <a:avLst/>
+          </a:prstGeom>
+          <a:noFill/>
+        </p:spPr>
+        <p:txBody>
+          <a:bodyPr wrap="none" rtlCol="0">
+            <a:spAutoFit/>
+          </a:bodyPr>
+          <a:lstStyle/>
+          <a:p>
+            <a:r>
+              <a:rPr lang="en-US" dirty="0"/>
+              <a:t>12am</a:t>
+            </a:r>
+          </a:p>
+        </p:txBody>
+      </p:sp>
+      <p:sp>
+        <p:nvSpPr>
+          <p:cNvPr id="7" name="TextBox 6">
+            <a:extLst>
+              <a:ext uri="{FF2B5EF4-FFF2-40B4-BE49-F238E27FC236}">
+                <a16:creationId xmlns:a16="http://schemas.microsoft.com/office/drawing/2014/main" id="{D40D6614-09E0-6C4C-B4A6-139551B671E1}"/>
+              </a:ext>
+            </a:extLst>
+          </p:cNvPr>
+          <p:cNvSpPr txBox="1"/>
+          <p:nvPr/>
+        </p:nvSpPr>
+        <p:spPr>
+          <a:xfrm>
+            <a:off x="11175375" y="3502581"/>
+            <a:ext cx="1016625" cy="369332"/>
+          </a:xfrm>
+          <a:prstGeom prst="rect">
+            <a:avLst/>
+          </a:prstGeom>
+          <a:noFill/>
+        </p:spPr>
+        <p:txBody>
+          <a:bodyPr wrap="none" rtlCol="0">
+            <a:spAutoFit/>
+          </a:bodyPr>
+          <a:lstStyle/>
+          <a:p>
+            <a:r>
+              <a:rPr lang="en-US" dirty="0"/>
+              <a:t>11.59pm</a:t>
+            </a:r>
+          </a:p>
+        </p:txBody>
+      </p:sp>
+      <p:sp>
+        <p:nvSpPr>
+          <p:cNvPr id="8" name="TextBox 7">
+            <a:extLst>
+              <a:ext uri="{FF2B5EF4-FFF2-40B4-BE49-F238E27FC236}">
+                <a16:creationId xmlns:a16="http://schemas.microsoft.com/office/drawing/2014/main" id="{DB784A13-7C6E-FA41-81E8-1ACBFA122B47}"/>
+              </a:ext>
+            </a:extLst>
+          </p:cNvPr>
+          <p:cNvSpPr txBox="1"/>
+          <p:nvPr/>
+        </p:nvSpPr>
+        <p:spPr>
+          <a:xfrm>
+            <a:off x="2528466" y="3502581"/>
+            <a:ext cx="724878" cy="369332"/>
+          </a:xfrm>
+          <a:prstGeom prst="rect">
+            <a:avLst/>
+          </a:prstGeom>
+          <a:noFill/>
+        </p:spPr>
+        <p:txBody>
+          <a:bodyPr wrap="none" rtlCol="0">
+            <a:spAutoFit/>
+          </a:bodyPr>
+          <a:lstStyle/>
+          <a:p>
+            <a:r>
+              <a:rPr lang="en-US" dirty="0"/>
+              <a:t>12pm</a:t>
+            </a:r>
+          </a:p>
+        </p:txBody>
+      </p:sp>
+      <p:sp>
+        <p:nvSpPr>
+          <p:cNvPr id="9" name="TextBox 8">
+            <a:extLst>
+              <a:ext uri="{FF2B5EF4-FFF2-40B4-BE49-F238E27FC236}">
+                <a16:creationId xmlns:a16="http://schemas.microsoft.com/office/drawing/2014/main" id="{E8C6C727-6C4A-7A4E-8BBE-463E1E06B4AB}"/>
+              </a:ext>
+            </a:extLst>
+          </p:cNvPr>
+          <p:cNvSpPr txBox="1"/>
+          <p:nvPr/>
+        </p:nvSpPr>
+        <p:spPr>
+          <a:xfrm>
+            <a:off x="5488141" y="3503653"/>
+            <a:ext cx="607859" cy="369332"/>
+          </a:xfrm>
+          <a:prstGeom prst="rect">
+            <a:avLst/>
+          </a:prstGeom>
+          <a:noFill/>
+        </p:spPr>
+        <p:txBody>
+          <a:bodyPr wrap="none" rtlCol="0">
+            <a:spAutoFit/>
+          </a:bodyPr>
+          <a:lstStyle/>
+          <a:p>
+            <a:r>
+              <a:rPr lang="en-US" dirty="0"/>
+              <a:t>5pm</a:t>
+            </a:r>
+          </a:p>
+        </p:txBody>
+      </p:sp>
+      <p:sp>
+        <p:nvSpPr>
+          <p:cNvPr id="11" name="TextBox 10">
+            <a:extLst>
+              <a:ext uri="{FF2B5EF4-FFF2-40B4-BE49-F238E27FC236}">
+                <a16:creationId xmlns:a16="http://schemas.microsoft.com/office/drawing/2014/main" id="{F14C68FA-6B01-544A-BF22-71223CED4606}"/>
+              </a:ext>
+            </a:extLst>
+          </p:cNvPr>
+          <p:cNvSpPr txBox="1"/>
+          <p:nvPr/>
+        </p:nvSpPr>
+        <p:spPr>
+          <a:xfrm>
+            <a:off x="1414463" y="3502581"/>
+            <a:ext cx="713657" cy="369332"/>
+          </a:xfrm>
+          <a:prstGeom prst="rect">
+            <a:avLst/>
+          </a:prstGeom>
+          <a:noFill/>
+        </p:spPr>
+        <p:txBody>
+          <a:bodyPr wrap="none" rtlCol="0">
+            <a:spAutoFit/>
+          </a:bodyPr>
+          <a:lstStyle/>
+          <a:p>
+            <a:r>
+              <a:rPr lang="en-US" dirty="0"/>
+              <a:t>10am</a:t>
+            </a:r>
+          </a:p>
+        </p:txBody>
+      </p:sp>
+      <p:pic>
+        <p:nvPicPr>
+          <p:cNvPr id="12" name="Picture 11">
+            <a:extLst>
+              <a:ext uri="{FF2B5EF4-FFF2-40B4-BE49-F238E27FC236}">
+                <a16:creationId xmlns:a16="http://schemas.microsoft.com/office/drawing/2014/main" id="{28AD0F1B-0754-5144-A8E2-B60A65642A0B}"/>
+              </a:ext>
+            </a:extLst>
+          </p:cNvPr>
+          <p:cNvPicPr>
+            <a:picLocks noChangeAspect="1"/>
+          </p:cNvPicPr>
+          <p:nvPr/>
+        </p:nvPicPr>
+        <p:blipFill>
+          <a:blip r:embed="rId2"/>
+          <a:stretch>
+            <a:fillRect/>
+          </a:stretch>
+        </p:blipFill>
+        <p:spPr>
+          <a:xfrm>
+            <a:off x="143578" y="0"/>
+            <a:ext cx="797257" cy="797257"/>
+          </a:xfrm>
+          <a:prstGeom prst="rect">
+            <a:avLst/>
+          </a:prstGeom>
+        </p:spPr>
+      </p:pic>
+      <p:pic>
+        <p:nvPicPr>
+          <p:cNvPr id="13" name="Picture 12">
+            <a:extLst>
+              <a:ext uri="{FF2B5EF4-FFF2-40B4-BE49-F238E27FC236}">
+                <a16:creationId xmlns:a16="http://schemas.microsoft.com/office/drawing/2014/main" id="{28DB0F6C-C29A-1245-8AFA-201B17704A7C}"/>
+              </a:ext>
+            </a:extLst>
+          </p:cNvPr>
+          <p:cNvPicPr>
+            <a:picLocks noChangeAspect="1"/>
+          </p:cNvPicPr>
+          <p:nvPr/>
+        </p:nvPicPr>
+        <p:blipFill>
+          <a:blip r:embed="rId3"/>
+          <a:stretch>
+            <a:fillRect/>
+          </a:stretch>
+        </p:blipFill>
+        <p:spPr>
+          <a:xfrm>
+            <a:off x="-15006" y="4796038"/>
+            <a:ext cx="1070018" cy="646469"/>
+          </a:xfrm>
+          <a:prstGeom prst="rect">
+            <a:avLst/>
+          </a:prstGeom>
+        </p:spPr>
+      </p:pic>
+      <p:sp>
+        <p:nvSpPr>
+          <p:cNvPr id="15" name="Rectangle 14">
+            <a:extLst>
+              <a:ext uri="{FF2B5EF4-FFF2-40B4-BE49-F238E27FC236}">
+                <a16:creationId xmlns:a16="http://schemas.microsoft.com/office/drawing/2014/main" id="{36B8B041-301D-B243-A516-17D16FF3EEDC}"/>
+              </a:ext>
+            </a:extLst>
+          </p:cNvPr>
+          <p:cNvSpPr/>
+          <p:nvPr/>
+        </p:nvSpPr>
+        <p:spPr>
+          <a:xfrm>
+            <a:off x="3219582" y="5721312"/>
+            <a:ext cx="1098418" cy="998742"/>
+          </a:xfrm>
+          <a:prstGeom prst="rect">
+            <a:avLst/>
+          </a:prstGeom>
+        </p:spPr>
+        <p:style>
+          <a:lnRef idx="2">
+            <a:schemeClr val="accent1">
+              <a:shade val="50000"/>
+            </a:schemeClr>
+          </a:lnRef>
+          <a:fillRef idx="1">
+            <a:schemeClr val="accent1"/>
+          </a:fillRef>
+          <a:effectRef idx="0">
+            <a:schemeClr val="accent1"/>
+          </a:effectRef>
+          <a:fontRef idx="minor">
+            <a:schemeClr val="lt1"/>
+          </a:fontRef>
+        </p:style>
+        <p:txBody>
+          <a:bodyPr rtlCol="0" anchor="ctr"/>
+          <a:lstStyle/>
+          <a:p>
+            <a:pPr algn="ctr"/>
+            <a:r>
+              <a:rPr lang="en-US" dirty="0"/>
+              <a:t>Jenkins-</a:t>
+            </a:r>
+            <a:r>
+              <a:rPr lang="en-US" dirty="0" err="1"/>
+              <a:t>Devops</a:t>
+            </a:r>
+            <a:r>
+              <a:rPr lang="en-US" dirty="0"/>
+              <a:t>-CI/CD pipelines</a:t>
+            </a:r>
+          </a:p>
+        </p:txBody>
+      </p:sp>
+      <p:cxnSp>
+        <p:nvCxnSpPr>
+          <p:cNvPr id="17" name="Straight Connector 16">
+            <a:extLst>
+              <a:ext uri="{FF2B5EF4-FFF2-40B4-BE49-F238E27FC236}">
+                <a16:creationId xmlns:a16="http://schemas.microsoft.com/office/drawing/2014/main" id="{FB0228EF-5970-6A4A-BB83-7F75CEE485C5}"/>
+              </a:ext>
+            </a:extLst>
+          </p:cNvPr>
+          <p:cNvCxnSpPr>
+            <a:endCxn id="12" idx="2"/>
+          </p:cNvCxnSpPr>
+          <p:nvPr/>
+        </p:nvCxnSpPr>
+        <p:spPr>
+          <a:xfrm flipH="1" flipV="1">
+            <a:off x="542207" y="797257"/>
+            <a:ext cx="872256" cy="2705324"/>
+          </a:xfrm>
+          <a:prstGeom prst="line">
+            <a:avLst/>
+          </a:prstGeom>
+        </p:spPr>
+        <p:style>
+          <a:lnRef idx="1">
+            <a:schemeClr val="accent1"/>
+          </a:lnRef>
+          <a:fillRef idx="0">
+            <a:schemeClr val="accent1"/>
+          </a:fillRef>
+          <a:effectRef idx="0">
+            <a:schemeClr val="accent1"/>
+          </a:effectRef>
+          <a:fontRef idx="minor">
+            <a:schemeClr val="tx1"/>
+          </a:fontRef>
+        </p:style>
+      </p:cxnSp>
+      <p:cxnSp>
+        <p:nvCxnSpPr>
+          <p:cNvPr id="19" name="Straight Connector 18">
+            <a:extLst>
+              <a:ext uri="{FF2B5EF4-FFF2-40B4-BE49-F238E27FC236}">
+                <a16:creationId xmlns:a16="http://schemas.microsoft.com/office/drawing/2014/main" id="{655F114D-F188-574F-B84C-913B3E0D54AB}"/>
+              </a:ext>
+            </a:extLst>
+          </p:cNvPr>
+          <p:cNvCxnSpPr>
+            <a:cxnSpLocks/>
+            <a:endCxn id="15" idx="0"/>
+          </p:cNvCxnSpPr>
+          <p:nvPr/>
+        </p:nvCxnSpPr>
+        <p:spPr>
+          <a:xfrm>
+            <a:off x="2948454" y="3871913"/>
+            <a:ext cx="820337" cy="1849399"/>
+          </a:xfrm>
+          <a:prstGeom prst="line">
+            <a:avLst/>
+          </a:prstGeom>
+        </p:spPr>
+        <p:style>
+          <a:lnRef idx="1">
+            <a:schemeClr val="accent1"/>
+          </a:lnRef>
+          <a:fillRef idx="0">
+            <a:schemeClr val="accent1"/>
+          </a:fillRef>
+          <a:effectRef idx="0">
+            <a:schemeClr val="accent1"/>
+          </a:effectRef>
+          <a:fontRef idx="minor">
+            <a:schemeClr val="tx1"/>
+          </a:fontRef>
+        </p:style>
+      </p:cxnSp>
+      <p:cxnSp>
+        <p:nvCxnSpPr>
+          <p:cNvPr id="21" name="Straight Connector 20">
+            <a:extLst>
+              <a:ext uri="{FF2B5EF4-FFF2-40B4-BE49-F238E27FC236}">
+                <a16:creationId xmlns:a16="http://schemas.microsoft.com/office/drawing/2014/main" id="{A1251325-C893-D242-9BBF-B1D5C4F0CC8D}"/>
+              </a:ext>
+            </a:extLst>
+          </p:cNvPr>
+          <p:cNvCxnSpPr>
+            <a:cxnSpLocks/>
+            <a:stCxn id="13" idx="3"/>
+            <a:endCxn id="15" idx="1"/>
+          </p:cNvCxnSpPr>
+          <p:nvPr/>
+        </p:nvCxnSpPr>
+        <p:spPr>
+          <a:xfrm>
+            <a:off x="1055012" y="5119273"/>
+            <a:ext cx="2164570" cy="1101410"/>
+          </a:xfrm>
+          <a:prstGeom prst="line">
+            <a:avLst/>
+          </a:prstGeom>
+        </p:spPr>
+        <p:style>
+          <a:lnRef idx="1">
+            <a:schemeClr val="accent1"/>
+          </a:lnRef>
+          <a:fillRef idx="0">
+            <a:schemeClr val="accent1"/>
+          </a:fillRef>
+          <a:effectRef idx="0">
+            <a:schemeClr val="accent1"/>
+          </a:effectRef>
+          <a:fontRef idx="minor">
+            <a:schemeClr val="tx1"/>
+          </a:fontRef>
+        </p:style>
+      </p:cxnSp>
+      <p:cxnSp>
+        <p:nvCxnSpPr>
+          <p:cNvPr id="26" name="Straight Connector 25">
+            <a:extLst>
+              <a:ext uri="{FF2B5EF4-FFF2-40B4-BE49-F238E27FC236}">
+                <a16:creationId xmlns:a16="http://schemas.microsoft.com/office/drawing/2014/main" id="{510B469C-1EBC-274C-A3B5-A34A733E1520}"/>
+              </a:ext>
+            </a:extLst>
+          </p:cNvPr>
+          <p:cNvCxnSpPr>
+            <a:stCxn id="9" idx="2"/>
+          </p:cNvCxnSpPr>
+          <p:nvPr/>
+        </p:nvCxnSpPr>
+        <p:spPr>
+          <a:xfrm flipH="1">
+            <a:off x="4318000" y="3872985"/>
+            <a:ext cx="1474071" cy="2334920"/>
+          </a:xfrm>
+          <a:prstGeom prst="line">
+            <a:avLst/>
+          </a:prstGeom>
+        </p:spPr>
+        <p:style>
+          <a:lnRef idx="1">
+            <a:schemeClr val="accent1"/>
+          </a:lnRef>
+          <a:fillRef idx="0">
+            <a:schemeClr val="accent1"/>
+          </a:fillRef>
+          <a:effectRef idx="0">
+            <a:schemeClr val="accent1"/>
+          </a:effectRef>
+          <a:fontRef idx="minor">
+            <a:schemeClr val="tx1"/>
+          </a:fontRef>
+        </p:style>
+      </p:cxnSp>
+      <p:cxnSp>
+        <p:nvCxnSpPr>
+          <p:cNvPr id="27" name="Straight Connector 26">
+            <a:extLst>
+              <a:ext uri="{FF2B5EF4-FFF2-40B4-BE49-F238E27FC236}">
+                <a16:creationId xmlns:a16="http://schemas.microsoft.com/office/drawing/2014/main" id="{6176A2D2-39D7-0B42-9CD3-61761E0A0763}"/>
+              </a:ext>
+            </a:extLst>
+          </p:cNvPr>
+          <p:cNvCxnSpPr>
+            <a:cxnSpLocks/>
+            <a:stCxn id="7" idx="2"/>
+            <a:endCxn id="15" idx="3"/>
+          </p:cNvCxnSpPr>
+          <p:nvPr/>
+        </p:nvCxnSpPr>
+        <p:spPr>
+          <a:xfrm flipH="1">
+            <a:off x="4318000" y="3871913"/>
+            <a:ext cx="7365688" cy="2348770"/>
+          </a:xfrm>
+          <a:prstGeom prst="line">
+            <a:avLst/>
+          </a:prstGeom>
+        </p:spPr>
+        <p:style>
+          <a:lnRef idx="1">
+            <a:schemeClr val="accent1"/>
+          </a:lnRef>
+          <a:fillRef idx="0">
+            <a:schemeClr val="accent1"/>
+          </a:fillRef>
+          <a:effectRef idx="0">
+            <a:schemeClr val="accent1"/>
+          </a:effectRef>
+          <a:fontRef idx="minor">
+            <a:schemeClr val="tx1"/>
+          </a:fontRef>
+        </p:style>
+      </p:cxnSp>
+    </p:spTree>
+    <p:extLst>
+      <p:ext uri="{BB962C8B-B14F-4D97-AF65-F5344CB8AC3E}">
+        <p14:creationId xmlns:p14="http://schemas.microsoft.com/office/powerpoint/2010/main" val="3503661775"/>
       </p:ext>
     </p:extLst>
   </p:cSld>

</xml_diff>